<commit_message>
Updated DistIF user manual.
</commit_message>
<xml_diff>
--- a/docs/DistIf/User_Guide.pptx
+++ b/docs/DistIf/User_Guide.pptx
@@ -122,6 +122,11 @@
       </a:defRPr>
     </a:lvl9pPr>
   </p:defaultTextStyle>
+  <p:extLst>
+    <p:ext uri="{EFAFB233-063F-42B5-8137-9DF3F51BA10A}">
+      <p15:sldGuideLst xmlns:p15="http://schemas.microsoft.com/office/powerpoint/2012/main"/>
+    </p:ext>
+  </p:extLst>
 </p:presentation>
 </file>
 
@@ -272,7 +277,7 @@
           <a:p>
             <a:fld id="{3F55234E-E65B-0E43-92F6-708E4CD60272}" type="datetimeFigureOut">
               <a:rPr lang="en-US" smtClean="0"/>
-              <a:t>10/30/24</a:t>
+              <a:t>11/11/24</a:t>
             </a:fld>
             <a:endParaRPr lang="en-US"/>
           </a:p>
@@ -470,7 +475,7 @@
           <a:p>
             <a:fld id="{3F55234E-E65B-0E43-92F6-708E4CD60272}" type="datetimeFigureOut">
               <a:rPr lang="en-US" smtClean="0"/>
-              <a:t>10/30/24</a:t>
+              <a:t>11/11/24</a:t>
             </a:fld>
             <a:endParaRPr lang="en-US"/>
           </a:p>
@@ -678,7 +683,7 @@
           <a:p>
             <a:fld id="{3F55234E-E65B-0E43-92F6-708E4CD60272}" type="datetimeFigureOut">
               <a:rPr lang="en-US" smtClean="0"/>
-              <a:t>10/30/24</a:t>
+              <a:t>11/11/24</a:t>
             </a:fld>
             <a:endParaRPr lang="en-US"/>
           </a:p>
@@ -876,7 +881,7 @@
           <a:p>
             <a:fld id="{3F55234E-E65B-0E43-92F6-708E4CD60272}" type="datetimeFigureOut">
               <a:rPr lang="en-US" smtClean="0"/>
-              <a:t>10/30/24</a:t>
+              <a:t>11/11/24</a:t>
             </a:fld>
             <a:endParaRPr lang="en-US"/>
           </a:p>
@@ -1151,7 +1156,7 @@
           <a:p>
             <a:fld id="{3F55234E-E65B-0E43-92F6-708E4CD60272}" type="datetimeFigureOut">
               <a:rPr lang="en-US" smtClean="0"/>
-              <a:t>10/30/24</a:t>
+              <a:t>11/11/24</a:t>
             </a:fld>
             <a:endParaRPr lang="en-US"/>
           </a:p>
@@ -1416,7 +1421,7 @@
           <a:p>
             <a:fld id="{3F55234E-E65B-0E43-92F6-708E4CD60272}" type="datetimeFigureOut">
               <a:rPr lang="en-US" smtClean="0"/>
-              <a:t>10/30/24</a:t>
+              <a:t>11/11/24</a:t>
             </a:fld>
             <a:endParaRPr lang="en-US"/>
           </a:p>
@@ -1828,7 +1833,7 @@
           <a:p>
             <a:fld id="{3F55234E-E65B-0E43-92F6-708E4CD60272}" type="datetimeFigureOut">
               <a:rPr lang="en-US" smtClean="0"/>
-              <a:t>10/30/24</a:t>
+              <a:t>11/11/24</a:t>
             </a:fld>
             <a:endParaRPr lang="en-US"/>
           </a:p>
@@ -1969,7 +1974,7 @@
           <a:p>
             <a:fld id="{3F55234E-E65B-0E43-92F6-708E4CD60272}" type="datetimeFigureOut">
               <a:rPr lang="en-US" smtClean="0"/>
-              <a:t>10/30/24</a:t>
+              <a:t>11/11/24</a:t>
             </a:fld>
             <a:endParaRPr lang="en-US"/>
           </a:p>
@@ -2082,7 +2087,7 @@
           <a:p>
             <a:fld id="{3F55234E-E65B-0E43-92F6-708E4CD60272}" type="datetimeFigureOut">
               <a:rPr lang="en-US" smtClean="0"/>
-              <a:t>10/30/24</a:t>
+              <a:t>11/11/24</a:t>
             </a:fld>
             <a:endParaRPr lang="en-US"/>
           </a:p>
@@ -2393,7 +2398,7 @@
           <a:p>
             <a:fld id="{3F55234E-E65B-0E43-92F6-708E4CD60272}" type="datetimeFigureOut">
               <a:rPr lang="en-US" smtClean="0"/>
-              <a:t>10/30/24</a:t>
+              <a:t>11/11/24</a:t>
             </a:fld>
             <a:endParaRPr lang="en-US"/>
           </a:p>
@@ -2681,7 +2686,7 @@
           <a:p>
             <a:fld id="{3F55234E-E65B-0E43-92F6-708E4CD60272}" type="datetimeFigureOut">
               <a:rPr lang="en-US" smtClean="0"/>
-              <a:t>10/30/24</a:t>
+              <a:t>11/11/24</a:t>
             </a:fld>
             <a:endParaRPr lang="en-US"/>
           </a:p>
@@ -2922,7 +2927,7 @@
           <a:p>
             <a:fld id="{3F55234E-E65B-0E43-92F6-708E4CD60272}" type="datetimeFigureOut">
               <a:rPr lang="en-US" smtClean="0"/>
-              <a:t>10/30/24</a:t>
+              <a:t>11/11/24</a:t>
             </a:fld>
             <a:endParaRPr lang="en-US"/>
           </a:p>
@@ -3418,7 +3423,7 @@
           <a:p>
             <a:r>
               <a:rPr lang="en-US" dirty="0"/>
-              <a:t>November 4, 2024</a:t>
+              <a:t>November 11, 2024</a:t>
             </a:r>
           </a:p>
         </p:txBody>
@@ -3504,7 +3509,15 @@
           <a:p>
             <a:r>
               <a:rPr lang="en-US" dirty="0"/>
-              <a:t>cd to sims/FDI/</a:t>
+              <a:t>cd to sims/</a:t>
+            </a:r>
+            <a:r>
+              <a:rPr lang="en-US" dirty="0" err="1"/>
+              <a:t>DistIf</a:t>
+            </a:r>
+            <a:r>
+              <a:rPr lang="en-US" dirty="0"/>
+              <a:t>/</a:t>
             </a:r>
             <a:r>
               <a:rPr lang="en-US" dirty="0" err="1"/>
@@ -3893,10 +3906,15 @@
             <p:ph idx="1"/>
           </p:nvPr>
         </p:nvSpPr>
-        <p:spPr/>
+        <p:spPr>
+          <a:xfrm>
+            <a:off x="838200" y="1450428"/>
+            <a:ext cx="10515600" cy="4726535"/>
+          </a:xfrm>
+        </p:spPr>
         <p:txBody>
           <a:bodyPr>
-            <a:normAutofit lnSpcReduction="10000"/>
+            <a:normAutofit fontScale="92500" lnSpcReduction="20000"/>
           </a:bodyPr>
           <a:lstStyle/>
           <a:p>
@@ -3939,6 +3957,40 @@
             <a:r>
               <a:rPr lang="en-US" dirty="0"/>
               <a:t>This might also work in bash, or you can make a bash version</a:t>
+            </a:r>
+          </a:p>
+          <a:p>
+            <a:pPr lvl="1"/>
+            <a:r>
+              <a:rPr lang="en-US" b="1" dirty="0"/>
+              <a:t>NOTE:</a:t>
+            </a:r>
+            <a:r>
+              <a:rPr lang="en-US" dirty="0"/>
+              <a:t> before launching, modify the ./</a:t>
+            </a:r>
+            <a:r>
+              <a:rPr lang="en-US" dirty="0" err="1"/>
+              <a:t>S_main</a:t>
+            </a:r>
+            <a:r>
+              <a:rPr lang="en-US" dirty="0"/>
+              <a:t>…exe command lines to add –r &lt;RTI CRC Host&gt;, the CRC host name, as needed (default is localhost)</a:t>
+            </a:r>
+          </a:p>
+          <a:p>
+            <a:pPr lvl="1"/>
+            <a:r>
+              <a:rPr lang="en-US" dirty="0"/>
+              <a:t>To display available command-line options, do ./</a:t>
+            </a:r>
+            <a:r>
+              <a:rPr lang="en-US" dirty="0" err="1"/>
+              <a:t>S_main</a:t>
+            </a:r>
+            <a:r>
+              <a:rPr lang="en-US" dirty="0"/>
+              <a:t>*.exe -h</a:t>
             </a:r>
           </a:p>
           <a:p>
@@ -6471,27 +6523,6 @@
             <a:pPr lvl="1"/>
             <a:r>
               <a:rPr lang="en-US" dirty="0" err="1"/>
-              <a:t>TrickHLA</a:t>
-            </a:r>
-            <a:r>
-              <a:rPr lang="en-US" dirty="0"/>
-              <a:t>: </a:t>
-            </a:r>
-            <a:r>
-              <a:rPr lang="en-US" dirty="0">
-                <a:hlinkClick r:id="rId3"/>
-              </a:rPr>
-              <a:t>https://github.com/nasa/trickhla</a:t>
-            </a:r>
-            <a:r>
-              <a:rPr lang="en-US" dirty="0"/>
-              <a:t>, recommend master branch</a:t>
-            </a:r>
-          </a:p>
-          <a:p>
-            <a:pPr lvl="1"/>
-            <a:r>
-              <a:rPr lang="en-US" dirty="0" err="1"/>
               <a:t>PitchRTI</a:t>
             </a:r>
             <a:endParaRPr lang="en-US" dirty="0"/>
@@ -6519,7 +6550,7 @@
             </a:r>
             <a:r>
               <a:rPr lang="en-US" dirty="0"/>
-              <a:t> clone folder</a:t>
+              <a:t> folder</a:t>
             </a:r>
           </a:p>
           <a:p>

</xml_diff>